<commit_message>
Fix a typo in git_checkout_branch slides.
</commit_message>
<xml_diff>
--- a/docs/images/git-checkout/git_checkout_branch.pptx
+++ b/docs/images/git-checkout/git_checkout_branch.pptx
@@ -296,7 +296,7 @@
           <a:p>
             <a:fld id="{8CB4B4FF-AE23-4E1E-B51C-5ED850CF274A}" type="datetimeFigureOut">
               <a:rPr kumimoji="1" lang="ja-JP" altLang="en-US" smtClean="0"/>
-              <a:t>2016/10/8</a:t>
+              <a:t>2016/11/29</a:t>
             </a:fld>
             <a:endParaRPr kumimoji="1" lang="ja-JP" altLang="en-US"/>
           </a:p>
@@ -498,7 +498,7 @@
           <a:p>
             <a:fld id="{8CB4B4FF-AE23-4E1E-B51C-5ED850CF274A}" type="datetimeFigureOut">
               <a:rPr kumimoji="1" lang="ja-JP" altLang="en-US" smtClean="0"/>
-              <a:t>2016/10/8</a:t>
+              <a:t>2016/11/29</a:t>
             </a:fld>
             <a:endParaRPr kumimoji="1" lang="ja-JP" altLang="en-US"/>
           </a:p>
@@ -710,7 +710,7 @@
           <a:p>
             <a:fld id="{8CB4B4FF-AE23-4E1E-B51C-5ED850CF274A}" type="datetimeFigureOut">
               <a:rPr kumimoji="1" lang="ja-JP" altLang="en-US" smtClean="0"/>
-              <a:t>2016/10/8</a:t>
+              <a:t>2016/11/29</a:t>
             </a:fld>
             <a:endParaRPr kumimoji="1" lang="ja-JP" altLang="en-US"/>
           </a:p>
@@ -912,7 +912,7 @@
           <a:p>
             <a:fld id="{8CB4B4FF-AE23-4E1E-B51C-5ED850CF274A}" type="datetimeFigureOut">
               <a:rPr kumimoji="1" lang="ja-JP" altLang="en-US" smtClean="0"/>
-              <a:t>2016/10/8</a:t>
+              <a:t>2016/11/29</a:t>
             </a:fld>
             <a:endParaRPr kumimoji="1" lang="ja-JP" altLang="en-US"/>
           </a:p>
@@ -1158,7 +1158,7 @@
           <a:p>
             <a:fld id="{8CB4B4FF-AE23-4E1E-B51C-5ED850CF274A}" type="datetimeFigureOut">
               <a:rPr kumimoji="1" lang="ja-JP" altLang="en-US" smtClean="0"/>
-              <a:t>2016/10/8</a:t>
+              <a:t>2016/11/29</a:t>
             </a:fld>
             <a:endParaRPr kumimoji="1" lang="ja-JP" altLang="en-US"/>
           </a:p>
@@ -1510,7 +1510,7 @@
           <a:p>
             <a:fld id="{8CB4B4FF-AE23-4E1E-B51C-5ED850CF274A}" type="datetimeFigureOut">
               <a:rPr kumimoji="1" lang="ja-JP" altLang="en-US" smtClean="0"/>
-              <a:t>2016/10/8</a:t>
+              <a:t>2016/11/29</a:t>
             </a:fld>
             <a:endParaRPr kumimoji="1" lang="ja-JP" altLang="en-US"/>
           </a:p>
@@ -1996,7 +1996,7 @@
           <a:p>
             <a:fld id="{8CB4B4FF-AE23-4E1E-B51C-5ED850CF274A}" type="datetimeFigureOut">
               <a:rPr kumimoji="1" lang="ja-JP" altLang="en-US" smtClean="0"/>
-              <a:t>2016/10/8</a:t>
+              <a:t>2016/11/29</a:t>
             </a:fld>
             <a:endParaRPr kumimoji="1" lang="ja-JP" altLang="en-US"/>
           </a:p>
@@ -2114,7 +2114,7 @@
           <a:p>
             <a:fld id="{8CB4B4FF-AE23-4E1E-B51C-5ED850CF274A}" type="datetimeFigureOut">
               <a:rPr kumimoji="1" lang="ja-JP" altLang="en-US" smtClean="0"/>
-              <a:t>2016/10/8</a:t>
+              <a:t>2016/11/29</a:t>
             </a:fld>
             <a:endParaRPr kumimoji="1" lang="ja-JP" altLang="en-US"/>
           </a:p>
@@ -2209,7 +2209,7 @@
           <a:p>
             <a:fld id="{8CB4B4FF-AE23-4E1E-B51C-5ED850CF274A}" type="datetimeFigureOut">
               <a:rPr kumimoji="1" lang="ja-JP" altLang="en-US" smtClean="0"/>
-              <a:t>2016/10/8</a:t>
+              <a:t>2016/11/29</a:t>
             </a:fld>
             <a:endParaRPr kumimoji="1" lang="ja-JP" altLang="en-US"/>
           </a:p>
@@ -2518,7 +2518,7 @@
           <a:p>
             <a:fld id="{8CB4B4FF-AE23-4E1E-B51C-5ED850CF274A}" type="datetimeFigureOut">
               <a:rPr kumimoji="1" lang="ja-JP" altLang="en-US" smtClean="0"/>
-              <a:t>2016/10/8</a:t>
+              <a:t>2016/11/29</a:t>
             </a:fld>
             <a:endParaRPr kumimoji="1" lang="ja-JP" altLang="en-US"/>
           </a:p>
@@ -2771,7 +2771,7 @@
           <a:p>
             <a:fld id="{8CB4B4FF-AE23-4E1E-B51C-5ED850CF274A}" type="datetimeFigureOut">
               <a:rPr kumimoji="1" lang="ja-JP" altLang="en-US" smtClean="0"/>
-              <a:t>2016/10/8</a:t>
+              <a:t>2016/11/29</a:t>
             </a:fld>
             <a:endParaRPr kumimoji="1" lang="ja-JP" altLang="en-US"/>
           </a:p>
@@ -3016,7 +3016,7 @@
           <a:p>
             <a:fld id="{8CB4B4FF-AE23-4E1E-B51C-5ED850CF274A}" type="datetimeFigureOut">
               <a:rPr kumimoji="1" lang="ja-JP" altLang="en-US" smtClean="0"/>
-              <a:t>2016/10/8</a:t>
+              <a:t>2016/11/29</a:t>
             </a:fld>
             <a:endParaRPr kumimoji="1" lang="ja-JP" altLang="en-US"/>
           </a:p>
@@ -3707,13 +3707,7 @@
               <a:rPr lang="ja-JP" altLang="en-US" b="1" dirty="0" smtClean="0">
                 <a:ea typeface="ＭＳ ゴシック" panose="020B0609070205080204" pitchFamily="49" charset="-128"/>
               </a:rPr>
-              <a:t>初期状態</a:t>
-            </a:r>
-            <a:r>
-              <a:rPr lang="ja-JP" altLang="en-US" b="1" dirty="0" smtClean="0">
-                <a:ea typeface="ＭＳ ゴシック" panose="020B0609070205080204" pitchFamily="49" charset="-128"/>
-              </a:rPr>
-              <a:t>。</a:t>
+              <a:t>初期状態。</a:t>
             </a:r>
             <a:endParaRPr lang="en-US" altLang="ja-JP" b="1" dirty="0" smtClean="0">
               <a:ea typeface="ＭＳ ゴシック" panose="020B0609070205080204" pitchFamily="49" charset="-128"/>
@@ -30808,16 +30802,28 @@
               <a:t>が</a:t>
             </a:r>
             <a:r>
-              <a:rPr lang="en-US" altLang="ja-JP" b="1" dirty="0" smtClean="0">
+              <a:rPr lang="ja-JP" altLang="en-US" b="1" dirty="0">
                 <a:ea typeface="ＭＳ ゴシック" panose="020B0609070205080204" pitchFamily="49" charset="-128"/>
               </a:rPr>
-              <a:t>dev</a:t>
+              <a:t>コミット</a:t>
+            </a:r>
+            <a:r>
+              <a:rPr lang="en-US" altLang="ja-JP" b="1" dirty="0">
+                <a:ea typeface="ＭＳ ゴシック" panose="020B0609070205080204" pitchFamily="49" charset="-128"/>
+              </a:rPr>
+              <a:t>A</a:t>
             </a:r>
             <a:r>
               <a:rPr lang="ja-JP" altLang="en-US" b="1" dirty="0" smtClean="0">
                 <a:ea typeface="ＭＳ ゴシック" panose="020B0609070205080204" pitchFamily="49" charset="-128"/>
               </a:rPr>
-              <a:t>を指すよう更新された。</a:t>
+              <a:t>を</a:t>
+            </a:r>
+            <a:r>
+              <a:rPr lang="ja-JP" altLang="en-US" b="1" dirty="0" smtClean="0">
+                <a:ea typeface="ＭＳ ゴシック" panose="020B0609070205080204" pitchFamily="49" charset="-128"/>
+              </a:rPr>
+              <a:t>指すよう更新された。</a:t>
             </a:r>
             <a:endParaRPr lang="en-US" altLang="ja-JP" b="1" dirty="0" smtClean="0">
               <a:ea typeface="ＭＳ ゴシック" panose="020B0609070205080204" pitchFamily="49" charset="-128"/>

</xml_diff>